<commit_message>
fix architecture mistake in az/subnet
</commit_message>
<xml_diff>
--- a/WebApp_architecture.pptx
+++ b/WebApp_architecture.pptx
@@ -8,6 +8,7 @@
     <p:sldId id="256" r:id="rId2"/>
     <p:sldId id="257" r:id="rId3"/>
     <p:sldId id="258" r:id="rId4"/>
+    <p:sldId id="259" r:id="rId5"/>
   </p:sldIdLst>
   <p:sldSz cx="12192000" cy="6858000"/>
   <p:notesSz cx="6858000" cy="9144000"/>
@@ -263,7 +264,7 @@
           <a:p>
             <a:fld id="{1ABFA2B3-75C2-8042-A778-8A4AC5AFD9D9}" type="datetimeFigureOut">
               <a:rPr lang="en-FR" smtClean="0"/>
-              <a:t>17/02/2023</a:t>
+              <a:t>10/03/2023</a:t>
             </a:fld>
             <a:endParaRPr lang="en-FR"/>
           </a:p>
@@ -463,7 +464,7 @@
           <a:p>
             <a:fld id="{1ABFA2B3-75C2-8042-A778-8A4AC5AFD9D9}" type="datetimeFigureOut">
               <a:rPr lang="en-FR" smtClean="0"/>
-              <a:t>17/02/2023</a:t>
+              <a:t>10/03/2023</a:t>
             </a:fld>
             <a:endParaRPr lang="en-FR"/>
           </a:p>
@@ -673,7 +674,7 @@
           <a:p>
             <a:fld id="{1ABFA2B3-75C2-8042-A778-8A4AC5AFD9D9}" type="datetimeFigureOut">
               <a:rPr lang="en-FR" smtClean="0"/>
-              <a:t>17/02/2023</a:t>
+              <a:t>10/03/2023</a:t>
             </a:fld>
             <a:endParaRPr lang="en-FR"/>
           </a:p>
@@ -873,7 +874,7 @@
           <a:p>
             <a:fld id="{1ABFA2B3-75C2-8042-A778-8A4AC5AFD9D9}" type="datetimeFigureOut">
               <a:rPr lang="en-FR" smtClean="0"/>
-              <a:t>17/02/2023</a:t>
+              <a:t>10/03/2023</a:t>
             </a:fld>
             <a:endParaRPr lang="en-FR"/>
           </a:p>
@@ -1149,7 +1150,7 @@
           <a:p>
             <a:fld id="{1ABFA2B3-75C2-8042-A778-8A4AC5AFD9D9}" type="datetimeFigureOut">
               <a:rPr lang="en-FR" smtClean="0"/>
-              <a:t>17/02/2023</a:t>
+              <a:t>10/03/2023</a:t>
             </a:fld>
             <a:endParaRPr lang="en-FR"/>
           </a:p>
@@ -1417,7 +1418,7 @@
           <a:p>
             <a:fld id="{1ABFA2B3-75C2-8042-A778-8A4AC5AFD9D9}" type="datetimeFigureOut">
               <a:rPr lang="en-FR" smtClean="0"/>
-              <a:t>17/02/2023</a:t>
+              <a:t>10/03/2023</a:t>
             </a:fld>
             <a:endParaRPr lang="en-FR"/>
           </a:p>
@@ -1832,7 +1833,7 @@
           <a:p>
             <a:fld id="{1ABFA2B3-75C2-8042-A778-8A4AC5AFD9D9}" type="datetimeFigureOut">
               <a:rPr lang="en-FR" smtClean="0"/>
-              <a:t>17/02/2023</a:t>
+              <a:t>10/03/2023</a:t>
             </a:fld>
             <a:endParaRPr lang="en-FR"/>
           </a:p>
@@ -1974,7 +1975,7 @@
           <a:p>
             <a:fld id="{1ABFA2B3-75C2-8042-A778-8A4AC5AFD9D9}" type="datetimeFigureOut">
               <a:rPr lang="en-FR" smtClean="0"/>
-              <a:t>17/02/2023</a:t>
+              <a:t>10/03/2023</a:t>
             </a:fld>
             <a:endParaRPr lang="en-FR"/>
           </a:p>
@@ -2087,7 +2088,7 @@
           <a:p>
             <a:fld id="{1ABFA2B3-75C2-8042-A778-8A4AC5AFD9D9}" type="datetimeFigureOut">
               <a:rPr lang="en-FR" smtClean="0"/>
-              <a:t>17/02/2023</a:t>
+              <a:t>10/03/2023</a:t>
             </a:fld>
             <a:endParaRPr lang="en-FR"/>
           </a:p>
@@ -2400,7 +2401,7 @@
           <a:p>
             <a:fld id="{1ABFA2B3-75C2-8042-A778-8A4AC5AFD9D9}" type="datetimeFigureOut">
               <a:rPr lang="en-FR" smtClean="0"/>
-              <a:t>17/02/2023</a:t>
+              <a:t>10/03/2023</a:t>
             </a:fld>
             <a:endParaRPr lang="en-FR"/>
           </a:p>
@@ -2689,7 +2690,7 @@
           <a:p>
             <a:fld id="{1ABFA2B3-75C2-8042-A778-8A4AC5AFD9D9}" type="datetimeFigureOut">
               <a:rPr lang="en-FR" smtClean="0"/>
-              <a:t>17/02/2023</a:t>
+              <a:t>10/03/2023</a:t>
             </a:fld>
             <a:endParaRPr lang="en-FR"/>
           </a:p>
@@ -2932,7 +2933,7 @@
           <a:p>
             <a:fld id="{1ABFA2B3-75C2-8042-A778-8A4AC5AFD9D9}" type="datetimeFigureOut">
               <a:rPr lang="en-FR" smtClean="0"/>
-              <a:t>17/02/2023</a:t>
+              <a:t>10/03/2023</a:t>
             </a:fld>
             <a:endParaRPr lang="en-FR"/>
           </a:p>
@@ -3649,6 +3650,120 @@
 </p:sld>
 </file>
 
+<file path=ppt/slides/slide4.xml><?xml version="1.0" encoding="utf-8"?>
+<p:sld xmlns:a="http://schemas.openxmlformats.org/drawingml/2006/main" xmlns:r="http://schemas.openxmlformats.org/officeDocument/2006/relationships" xmlns:p="http://schemas.openxmlformats.org/presentationml/2006/main">
+  <p:cSld>
+    <p:spTree>
+      <p:nvGrpSpPr>
+        <p:cNvPr id="1" name=""/>
+        <p:cNvGrpSpPr/>
+        <p:nvPr/>
+      </p:nvGrpSpPr>
+      <p:grpSpPr>
+        <a:xfrm>
+          <a:off x="0" y="0"/>
+          <a:ext cx="0" cy="0"/>
+          <a:chOff x="0" y="0"/>
+          <a:chExt cx="0" cy="0"/>
+        </a:xfrm>
+      </p:grpSpPr>
+      <p:sp>
+        <p:nvSpPr>
+          <p:cNvPr id="2" name="Title 1">
+            <a:extLst>
+              <a:ext uri="{FF2B5EF4-FFF2-40B4-BE49-F238E27FC236}">
+                <a16:creationId xmlns:a16="http://schemas.microsoft.com/office/drawing/2014/main" id="{C0A746FC-4822-C7B2-BB92-C77199BA2E56}"/>
+              </a:ext>
+            </a:extLst>
+          </p:cNvPr>
+          <p:cNvSpPr>
+            <a:spLocks noGrp="1"/>
+          </p:cNvSpPr>
+          <p:nvPr>
+            <p:ph type="title"/>
+          </p:nvPr>
+        </p:nvSpPr>
+        <p:spPr>
+          <a:xfrm>
+            <a:off x="1838739" y="536713"/>
+            <a:ext cx="9664148" cy="1144036"/>
+          </a:xfrm>
+        </p:spPr>
+        <p:txBody>
+          <a:bodyPr>
+            <a:normAutofit/>
+          </a:bodyPr>
+          <a:lstStyle/>
+          <a:p>
+            <a:r>
+              <a:rPr lang="en-GB" sz="2800" dirty="0"/>
+              <a:t>Fix </a:t>
+            </a:r>
+            <a:r>
+              <a:rPr lang="en-GB" sz="2800" dirty="0" err="1"/>
+              <a:t>archi</a:t>
+            </a:r>
+            <a:r>
+              <a:rPr lang="en-GB" sz="2800" dirty="0"/>
+              <a:t> mistake related to </a:t>
+            </a:r>
+            <a:r>
+              <a:rPr lang="en-GB" sz="2800" dirty="0" err="1"/>
+              <a:t>az</a:t>
+            </a:r>
+            <a:r>
+              <a:rPr lang="en-GB" sz="2800" dirty="0"/>
+              <a:t> and subnets</a:t>
+            </a:r>
+            <a:endParaRPr lang="en-FR" sz="2800" dirty="0"/>
+          </a:p>
+        </p:txBody>
+      </p:sp>
+      <p:pic>
+        <p:nvPicPr>
+          <p:cNvPr id="4" name="Content Placeholder 3">
+            <a:extLst>
+              <a:ext uri="{FF2B5EF4-FFF2-40B4-BE49-F238E27FC236}">
+                <a16:creationId xmlns:a16="http://schemas.microsoft.com/office/drawing/2014/main" id="{E98EE8B7-7211-3623-87E3-1DF2970F6910}"/>
+              </a:ext>
+            </a:extLst>
+          </p:cNvPr>
+          <p:cNvPicPr>
+            <a:picLocks noGrp="1" noChangeAspect="1"/>
+          </p:cNvPicPr>
+          <p:nvPr>
+            <p:ph idx="1"/>
+          </p:nvPr>
+        </p:nvPicPr>
+        <p:blipFill>
+          <a:blip r:embed="rId2"/>
+          <a:stretch>
+            <a:fillRect/>
+          </a:stretch>
+        </p:blipFill>
+        <p:spPr>
+          <a:xfrm>
+            <a:off x="1639861" y="1825625"/>
+            <a:ext cx="8912278" cy="4351338"/>
+          </a:xfrm>
+          <a:prstGeom prst="rect">
+            <a:avLst/>
+          </a:prstGeom>
+        </p:spPr>
+      </p:pic>
+    </p:spTree>
+    <p:extLst>
+      <p:ext uri="{BB962C8B-B14F-4D97-AF65-F5344CB8AC3E}">
+        <p14:creationId xmlns:p14="http://schemas.microsoft.com/office/powerpoint/2010/main" val="3370175997"/>
+      </p:ext>
+    </p:extLst>
+  </p:cSld>
+  <p:clrMapOvr>
+    <a:masterClrMapping/>
+  </p:clrMapOvr>
+</p:sld>
+</file>
+
 <file path=ppt/theme/theme1.xml><?xml version="1.0" encoding="utf-8"?>
 <a:theme xmlns:a="http://schemas.openxmlformats.org/drawingml/2006/main" name="Office Theme">
   <a:themeElements>

</xml_diff>